<commit_message>
Sample TankBlaster bot in Node.js
</commit_message>
<xml_diff>
--- a/Documentation/HelloWars - TankBlaster.pptx
+++ b/Documentation/HelloWars - TankBlaster.pptx
@@ -21,8 +21,8 @@
     <p:sldId id="392" r:id="rId12"/>
     <p:sldId id="387" r:id="rId13"/>
     <p:sldId id="389" r:id="rId14"/>
-    <p:sldId id="390" r:id="rId15"/>
-    <p:sldId id="391" r:id="rId16"/>
+    <p:sldId id="391" r:id="rId15"/>
+    <p:sldId id="394" r:id="rId16"/>
     <p:sldId id="294" r:id="rId17"/>
   </p:sldIdLst>
   <p:sldSz cx="24384000" cy="13716000"/>
@@ -105,6 +105,11 @@
     <p:ext uri="{EFAFB233-063F-42B5-8137-9DF3F51BA10A}">
       <p15:sldGuideLst xmlns:p15="http://schemas.microsoft.com/office/powerpoint/2012/main">
         <p15:guide id="4" pos="1367">
+          <p15:clr>
+            <a:srgbClr val="A4A3A4"/>
+          </p15:clr>
+        </p15:guide>
+        <p15:guide id="5" orient="horz" pos="4320">
           <p15:clr>
             <a:srgbClr val="A4A3A4"/>
           </p15:clr>
@@ -363,6 +368,67 @@
     <p:extLst>
       <p:ext uri="{BB962C8B-B14F-4D97-AF65-F5344CB8AC3E}">
         <p14:creationId xmlns:p14="http://schemas.microsoft.com/office/powerpoint/2010/main" val="77373813"/>
+      </p:ext>
+    </p:extLst>
+  </p:cSld>
+  <p:clrMapOvr>
+    <a:masterClrMapping/>
+  </p:clrMapOvr>
+</p:notes>
+</file>
+
+<file path=ppt/notesSlides/notesSlide2.xml><?xml version="1.0" encoding="utf-8"?>
+<p:notes xmlns:a="http://schemas.openxmlformats.org/drawingml/2006/main" xmlns:r="http://schemas.openxmlformats.org/officeDocument/2006/relationships" xmlns:p="http://schemas.openxmlformats.org/presentationml/2006/main">
+  <p:cSld>
+    <p:spTree>
+      <p:nvGrpSpPr>
+        <p:cNvPr id="1" name=""/>
+        <p:cNvGrpSpPr/>
+        <p:nvPr/>
+      </p:nvGrpSpPr>
+      <p:grpSpPr>
+        <a:xfrm>
+          <a:off x="0" y="0"/>
+          <a:ext cx="0" cy="0"/>
+          <a:chOff x="0" y="0"/>
+          <a:chExt cx="0" cy="0"/>
+        </a:xfrm>
+      </p:grpSpPr>
+      <p:sp>
+        <p:nvSpPr>
+          <p:cNvPr id="2" name="Symbol zastępczy obrazu slajdu 1"/>
+          <p:cNvSpPr>
+            <a:spLocks noGrp="1" noRot="1" noChangeAspect="1"/>
+          </p:cNvSpPr>
+          <p:nvPr>
+            <p:ph type="sldImg"/>
+          </p:nvPr>
+        </p:nvSpPr>
+        <p:spPr/>
+      </p:sp>
+      <p:sp>
+        <p:nvSpPr>
+          <p:cNvPr id="3" name="Symbol zastępczy notatek 2"/>
+          <p:cNvSpPr>
+            <a:spLocks noGrp="1"/>
+          </p:cNvSpPr>
+          <p:nvPr>
+            <p:ph type="body" idx="1"/>
+          </p:nvPr>
+        </p:nvSpPr>
+        <p:spPr/>
+        <p:txBody>
+          <a:bodyPr/>
+          <a:lstStyle/>
+          <a:p>
+            <a:endParaRPr lang="pl-PL" dirty="0"/>
+          </a:p>
+        </p:txBody>
+      </p:sp>
+    </p:spTree>
+    <p:extLst>
+      <p:ext uri="{BB962C8B-B14F-4D97-AF65-F5344CB8AC3E}">
+        <p14:creationId xmlns:p14="http://schemas.microsoft.com/office/powerpoint/2010/main" val="300900933"/>
       </p:ext>
     </p:extLst>
   </p:cSld>
@@ -2596,7 +2662,7 @@
           </a:ln>
           <a:extLst>
             <a:ext uri="{C572A759-6A51-4108-AA02-DFA0A04FC94B}">
-              <ma14:wrappingTextBoxFlag xmlns="" xmlns:ma14="http://schemas.microsoft.com/office/mac/drawingml/2011/main" val="1"/>
+              <ma14:wrappingTextBoxFlag xmlns:ma14="http://schemas.microsoft.com/office/mac/drawingml/2011/main" xmlns="" val="1"/>
             </a:ext>
           </a:extLst>
         </p:spPr>
@@ -2656,13 +2722,6 @@
               </a:rPr>
               <a:t> </a:t>
             </a:r>
-            <a:endParaRPr lang="en-GB" sz="3100" dirty="0">
-              <a:solidFill>
-                <a:schemeClr val="bg1"/>
-              </a:solidFill>
-              <a:latin typeface="Arial"/>
-              <a:cs typeface="Arial"/>
-            </a:endParaRPr>
           </a:p>
         </p:txBody>
       </p:sp>
@@ -3199,7 +3258,7 @@
           </a:ln>
           <a:extLst>
             <a:ext uri="{C572A759-6A51-4108-AA02-DFA0A04FC94B}">
-              <ma14:wrappingTextBoxFlag xmlns="" xmlns:ma14="http://schemas.microsoft.com/office/mac/drawingml/2011/main" val="1"/>
+              <ma14:wrappingTextBoxFlag xmlns:ma14="http://schemas.microsoft.com/office/mac/drawingml/2011/main" xmlns="" val="1"/>
             </a:ext>
           </a:extLst>
         </p:spPr>
@@ -3259,13 +3318,6 @@
               </a:rPr>
               <a:t> </a:t>
             </a:r>
-            <a:endParaRPr lang="en-GB" sz="3100" dirty="0">
-              <a:solidFill>
-                <a:schemeClr val="bg1"/>
-              </a:solidFill>
-              <a:latin typeface="Arial"/>
-              <a:cs typeface="Arial"/>
-            </a:endParaRPr>
           </a:p>
         </p:txBody>
       </p:sp>
@@ -4133,7 +4185,7 @@
           </a:ln>
           <a:extLst>
             <a:ext uri="{C572A759-6A51-4108-AA02-DFA0A04FC94B}">
-              <ma14:wrappingTextBoxFlag xmlns="" xmlns:ma14="http://schemas.microsoft.com/office/mac/drawingml/2011/main" val="1"/>
+              <ma14:wrappingTextBoxFlag xmlns:ma14="http://schemas.microsoft.com/office/mac/drawingml/2011/main" xmlns="" val="1"/>
             </a:ext>
           </a:extLst>
         </p:spPr>
@@ -4193,13 +4245,6 @@
               </a:rPr>
               <a:t> </a:t>
             </a:r>
-            <a:endParaRPr lang="en-GB" sz="3100" dirty="0">
-              <a:solidFill>
-                <a:schemeClr val="bg1"/>
-              </a:solidFill>
-              <a:latin typeface="Arial"/>
-              <a:cs typeface="Arial"/>
-            </a:endParaRPr>
           </a:p>
         </p:txBody>
       </p:sp>
@@ -4737,7 +4782,7 @@
           </a:ln>
           <a:extLst>
             <a:ext uri="{C572A759-6A51-4108-AA02-DFA0A04FC94B}">
-              <ma14:wrappingTextBoxFlag xmlns="" xmlns:ma14="http://schemas.microsoft.com/office/mac/drawingml/2011/main" val="1"/>
+              <ma14:wrappingTextBoxFlag xmlns:ma14="http://schemas.microsoft.com/office/mac/drawingml/2011/main" xmlns="" val="1"/>
             </a:ext>
           </a:extLst>
         </p:spPr>
@@ -4797,13 +4842,6 @@
               </a:rPr>
               <a:t> </a:t>
             </a:r>
-            <a:endParaRPr lang="en-GB" sz="3100" dirty="0">
-              <a:solidFill>
-                <a:schemeClr val="bg1"/>
-              </a:solidFill>
-              <a:latin typeface="Arial"/>
-              <a:cs typeface="Arial"/>
-            </a:endParaRPr>
           </a:p>
         </p:txBody>
       </p:sp>
@@ -4862,8 +4900,8 @@
           <a:p>
             <a:pPr algn="l"/>
             <a:r>
-              <a:rPr lang="pl-PL" dirty="0"/>
-              <a:t>PHP bot </a:t>
+              <a:rPr lang="pl-PL" dirty="0" smtClean="0"/>
+              <a:t>Java bot </a:t>
             </a:r>
             <a:r>
               <a:rPr lang="pl-PL" dirty="0" err="1"/>
@@ -4896,7 +4934,7 @@
         </p:spPr>
         <p:txBody>
           <a:bodyPr numCol="1">
-            <a:normAutofit fontScale="92500"/>
+            <a:normAutofit/>
           </a:bodyPr>
           <a:lstStyle>
             <a:lvl1pPr marL="342900" indent="-342900">
@@ -5111,7 +5149,7 @@
                 <a:latin typeface="Arial"/>
                 <a:cs typeface="Arial"/>
               </a:rPr>
-              <a:t>Download WAMP server from http://www.wampserver.com/ and install it</a:t>
+              <a:t>Import bot from HELLOWARS/JAVA folder to your workspace</a:t>
             </a:r>
           </a:p>
           <a:p>
@@ -5138,7 +5176,7 @@
                 <a:latin typeface="Arial"/>
                 <a:cs typeface="Arial"/>
               </a:rPr>
-              <a:t>Copy folder "</a:t>
+              <a:t>Find </a:t>
             </a:r>
             <a:r>
               <a:rPr lang="en-US" sz="5800" dirty="0" err="1">
@@ -5150,6 +5188,30 @@
                 <a:latin typeface="Arial"/>
                 <a:cs typeface="Arial"/>
               </a:rPr>
+              <a:t>InetSocketAddress</a:t>
+            </a:r>
+            <a:r>
+              <a:rPr lang="en-US" sz="5800" dirty="0">
+                <a:solidFill>
+                  <a:schemeClr val="bg1">
+                    <a:lumMod val="50000"/>
+                  </a:schemeClr>
+                </a:solidFill>
+                <a:latin typeface="Arial"/>
+                <a:cs typeface="Arial"/>
+              </a:rPr>
+              <a:t> method in </a:t>
+            </a:r>
+            <a:r>
+              <a:rPr lang="en-US" sz="5800" dirty="0" err="1">
+                <a:solidFill>
+                  <a:schemeClr val="bg1">
+                    <a:lumMod val="50000"/>
+                  </a:schemeClr>
+                </a:solidFill>
+                <a:latin typeface="Arial"/>
+                <a:cs typeface="Arial"/>
+              </a:rPr>
               <a:t>TankBlasterBot</a:t>
             </a:r>
             <a:r>
@@ -5162,55 +5224,7 @@
                 <a:latin typeface="Arial"/>
                 <a:cs typeface="Arial"/>
               </a:rPr>
-              <a:t>" (</a:t>
-            </a:r>
-            <a:r>
-              <a:rPr lang="en-US" sz="5800" dirty="0" err="1">
-                <a:solidFill>
-                  <a:schemeClr val="bg1">
-                    <a:lumMod val="50000"/>
-                  </a:schemeClr>
-                </a:solidFill>
-                <a:latin typeface="Arial"/>
-                <a:cs typeface="Arial"/>
-              </a:rPr>
-              <a:t>hello_wars</a:t>
-            </a:r>
-            <a:r>
-              <a:rPr lang="en-US" sz="5800" dirty="0">
-                <a:solidFill>
-                  <a:schemeClr val="bg1">
-                    <a:lumMod val="50000"/>
-                  </a:schemeClr>
-                </a:solidFill>
-                <a:latin typeface="Arial"/>
-                <a:cs typeface="Arial"/>
-              </a:rPr>
-              <a:t>/PHP/</a:t>
-            </a:r>
-            <a:r>
-              <a:rPr lang="en-US" sz="5800" dirty="0" err="1">
-                <a:solidFill>
-                  <a:schemeClr val="bg1">
-                    <a:lumMod val="50000"/>
-                  </a:schemeClr>
-                </a:solidFill>
-                <a:latin typeface="Arial"/>
-                <a:cs typeface="Arial"/>
-              </a:rPr>
-              <a:t>TankBlaster</a:t>
-            </a:r>
-            <a:r>
-              <a:rPr lang="en-US" sz="5800" dirty="0">
-                <a:solidFill>
-                  <a:schemeClr val="bg1">
-                    <a:lumMod val="50000"/>
-                  </a:schemeClr>
-                </a:solidFill>
-                <a:latin typeface="Arial"/>
-                <a:cs typeface="Arial"/>
-              </a:rPr>
-              <a:t>/) to your WAMP server www folder (default "C:/wamp/www" on Windows)</a:t>
+              <a:t> class and change port number to some valid port number</a:t>
             </a:r>
           </a:p>
           <a:p>
@@ -5237,7 +5251,7 @@
                 <a:latin typeface="Arial"/>
                 <a:cs typeface="Arial"/>
               </a:rPr>
-              <a:t>Run WAMP</a:t>
+              <a:t>Run project</a:t>
             </a:r>
           </a:p>
           <a:p>
@@ -5264,7 +5278,55 @@
                 <a:latin typeface="Arial"/>
                 <a:cs typeface="Arial"/>
               </a:rPr>
-              <a:t>Your bot should be accessible at "http://localhost/tankblasterbot/". Check "http://localhost/tankblasterbot/info" in your browser to see if it works</a:t>
+              <a:t>You can check if bot is running typing http://localhost:9065/info in </a:t>
+            </a:r>
+            <a:r>
+              <a:rPr lang="en-US" sz="5800" dirty="0" err="1">
+                <a:solidFill>
+                  <a:schemeClr val="bg1">
+                    <a:lumMod val="50000"/>
+                  </a:schemeClr>
+                </a:solidFill>
+                <a:latin typeface="Arial"/>
+                <a:cs typeface="Arial"/>
+              </a:rPr>
+              <a:t>webbrowser</a:t>
+            </a:r>
+            <a:endParaRPr lang="en-US" sz="5800" dirty="0">
+              <a:solidFill>
+                <a:schemeClr val="bg1">
+                  <a:lumMod val="50000"/>
+                </a:schemeClr>
+              </a:solidFill>
+              <a:latin typeface="Arial"/>
+              <a:cs typeface="Arial"/>
+            </a:endParaRPr>
+          </a:p>
+          <a:p>
+            <a:pPr marL="857250" indent="-857250">
+              <a:spcBef>
+                <a:spcPts val="3200"/>
+              </a:spcBef>
+              <a:spcAft>
+                <a:spcPts val="1600"/>
+              </a:spcAft>
+              <a:buClr>
+                <a:srgbClr val="E4171F"/>
+              </a:buClr>
+              <a:buFont typeface="Arial"/>
+              <a:buChar char="•"/>
+            </a:pPr>
+            <a:r>
+              <a:rPr lang="en-US" sz="5800" dirty="0">
+                <a:solidFill>
+                  <a:schemeClr val="bg1">
+                    <a:lumMod val="50000"/>
+                  </a:schemeClr>
+                </a:solidFill>
+                <a:latin typeface="Arial"/>
+                <a:cs typeface="Arial"/>
+              </a:rPr>
+              <a:t>You can disable your bot calling http://localhost:9065/close</a:t>
             </a:r>
           </a:p>
           <a:p>
@@ -5341,7 +5403,7 @@
           </a:ln>
           <a:extLst>
             <a:ext uri="{C572A759-6A51-4108-AA02-DFA0A04FC94B}">
-              <ma14:wrappingTextBoxFlag xmlns="" xmlns:ma14="http://schemas.microsoft.com/office/mac/drawingml/2011/main" val="1"/>
+              <ma14:wrappingTextBoxFlag xmlns:ma14="http://schemas.microsoft.com/office/mac/drawingml/2011/main" xmlns="" val="1"/>
             </a:ext>
           </a:extLst>
         </p:spPr>
@@ -5401,20 +5463,13 @@
               </a:rPr>
               <a:t> </a:t>
             </a:r>
-            <a:endParaRPr lang="en-GB" sz="3100" dirty="0">
-              <a:solidFill>
-                <a:schemeClr val="bg1"/>
-              </a:solidFill>
-              <a:latin typeface="Arial"/>
-              <a:cs typeface="Arial"/>
-            </a:endParaRPr>
           </a:p>
         </p:txBody>
       </p:sp>
     </p:spTree>
     <p:extLst>
       <p:ext uri="{BB962C8B-B14F-4D97-AF65-F5344CB8AC3E}">
-        <p14:creationId xmlns:p14="http://schemas.microsoft.com/office/powerpoint/2010/main" val="3325525668"/>
+        <p14:creationId xmlns:p14="http://schemas.microsoft.com/office/powerpoint/2010/main" val="1153594365"/>
       </p:ext>
     </p:extLst>
   </p:cSld>
@@ -5467,7 +5522,7 @@
             <a:pPr algn="l"/>
             <a:r>
               <a:rPr lang="pl-PL" dirty="0" smtClean="0"/>
-              <a:t>Java bot </a:t>
+              <a:t>Node.js bot </a:t>
             </a:r>
             <a:r>
               <a:rPr lang="pl-PL" dirty="0" err="1"/>
@@ -5500,7 +5555,7 @@
         </p:spPr>
         <p:txBody>
           <a:bodyPr numCol="1">
-            <a:normAutofit/>
+            <a:normAutofit fontScale="92500" lnSpcReduction="20000"/>
           </a:bodyPr>
           <a:lstStyle>
             <a:lvl1pPr marL="342900" indent="-342900">
@@ -5715,7 +5770,7 @@
                 <a:latin typeface="Arial"/>
                 <a:cs typeface="Arial"/>
               </a:rPr>
-              <a:t>Import bot from HELLOWARS/JAVA folder to your workspace</a:t>
+              <a:t>Download Node.js from https://nodejs.org/en/ and install it</a:t>
             </a:r>
           </a:p>
           <a:p>
@@ -5742,7 +5797,7 @@
                 <a:latin typeface="Arial"/>
                 <a:cs typeface="Arial"/>
               </a:rPr>
-              <a:t>Find </a:t>
+              <a:t>Copy folder "</a:t>
             </a:r>
             <a:r>
               <a:rPr lang="en-US" sz="5800" dirty="0" err="1">
@@ -5754,7 +5809,7 @@
                 <a:latin typeface="Arial"/>
                 <a:cs typeface="Arial"/>
               </a:rPr>
-              <a:t>InetSocketAddress</a:t>
+              <a:t>TankBlasterBot</a:t>
             </a:r>
             <a:r>
               <a:rPr lang="en-US" sz="5800" dirty="0">
@@ -5766,7 +5821,7 @@
                 <a:latin typeface="Arial"/>
                 <a:cs typeface="Arial"/>
               </a:rPr>
-              <a:t> method in </a:t>
+              <a:t>" (</a:t>
             </a:r>
             <a:r>
               <a:rPr lang="en-US" sz="5800" dirty="0" err="1">
@@ -5778,6 +5833,54 @@
                 <a:latin typeface="Arial"/>
                 <a:cs typeface="Arial"/>
               </a:rPr>
+              <a:t>hello_wars</a:t>
+            </a:r>
+            <a:r>
+              <a:rPr lang="en-US" sz="5800" dirty="0">
+                <a:solidFill>
+                  <a:schemeClr val="bg1">
+                    <a:lumMod val="50000"/>
+                  </a:schemeClr>
+                </a:solidFill>
+                <a:latin typeface="Arial"/>
+                <a:cs typeface="Arial"/>
+              </a:rPr>
+              <a:t>/</a:t>
+            </a:r>
+            <a:r>
+              <a:rPr lang="en-US" sz="5800" dirty="0" err="1">
+                <a:solidFill>
+                  <a:schemeClr val="bg1">
+                    <a:lumMod val="50000"/>
+                  </a:schemeClr>
+                </a:solidFill>
+                <a:latin typeface="Arial"/>
+                <a:cs typeface="Arial"/>
+              </a:rPr>
+              <a:t>nodeJs</a:t>
+            </a:r>
+            <a:r>
+              <a:rPr lang="en-US" sz="5800" dirty="0">
+                <a:solidFill>
+                  <a:schemeClr val="bg1">
+                    <a:lumMod val="50000"/>
+                  </a:schemeClr>
+                </a:solidFill>
+                <a:latin typeface="Arial"/>
+                <a:cs typeface="Arial"/>
+              </a:rPr>
+              <a:t>/</a:t>
+            </a:r>
+            <a:r>
+              <a:rPr lang="en-US" sz="5800" dirty="0" err="1">
+                <a:solidFill>
+                  <a:schemeClr val="bg1">
+                    <a:lumMod val="50000"/>
+                  </a:schemeClr>
+                </a:solidFill>
+                <a:latin typeface="Arial"/>
+                <a:cs typeface="Arial"/>
+              </a:rPr>
               <a:t>TankBlasterBot</a:t>
             </a:r>
             <a:r>
@@ -5790,7 +5893,7 @@
                 <a:latin typeface="Arial"/>
                 <a:cs typeface="Arial"/>
               </a:rPr>
-              <a:t> class and change port number to some valid port number</a:t>
+              <a:t>/) to your local directory</a:t>
             </a:r>
           </a:p>
           <a:p>
@@ -5817,7 +5920,7 @@
                 <a:latin typeface="Arial"/>
                 <a:cs typeface="Arial"/>
               </a:rPr>
-              <a:t>Run project</a:t>
+              <a:t>Open command prompt and go to project directory</a:t>
             </a:r>
           </a:p>
           <a:p>
@@ -5844,7 +5947,7 @@
                 <a:latin typeface="Arial"/>
                 <a:cs typeface="Arial"/>
               </a:rPr>
-              <a:t>You can check if bot is running typing http://localhost:9065/info in </a:t>
+              <a:t>Type "</a:t>
             </a:r>
             <a:r>
               <a:rPr lang="en-US" sz="5800" dirty="0" err="1">
@@ -5856,17 +5959,20 @@
                 <a:latin typeface="Arial"/>
                 <a:cs typeface="Arial"/>
               </a:rPr>
-              <a:t>webbrowser</a:t>
-            </a:r>
-            <a:endParaRPr lang="en-US" sz="5800" dirty="0">
-              <a:solidFill>
-                <a:schemeClr val="bg1">
-                  <a:lumMod val="50000"/>
-                </a:schemeClr>
-              </a:solidFill>
-              <a:latin typeface="Arial"/>
-              <a:cs typeface="Arial"/>
-            </a:endParaRPr>
+              <a:t>npm</a:t>
+            </a:r>
+            <a:r>
+              <a:rPr lang="en-US" sz="5800" dirty="0">
+                <a:solidFill>
+                  <a:schemeClr val="bg1">
+                    <a:lumMod val="50000"/>
+                  </a:schemeClr>
+                </a:solidFill>
+                <a:latin typeface="Arial"/>
+                <a:cs typeface="Arial"/>
+              </a:rPr>
+              <a:t> install express" to install express framework for Node.js</a:t>
+            </a:r>
           </a:p>
           <a:p>
             <a:pPr marL="857250" indent="-857250">
@@ -5892,7 +5998,31 @@
                 <a:latin typeface="Arial"/>
                 <a:cs typeface="Arial"/>
               </a:rPr>
-              <a:t>You can disable your bot calling http://localhost:9065/close</a:t>
+              <a:t>Type "</a:t>
+            </a:r>
+            <a:r>
+              <a:rPr lang="en-US" sz="5800" dirty="0" err="1">
+                <a:solidFill>
+                  <a:schemeClr val="bg1">
+                    <a:lumMod val="50000"/>
+                  </a:schemeClr>
+                </a:solidFill>
+                <a:latin typeface="Arial"/>
+                <a:cs typeface="Arial"/>
+              </a:rPr>
+              <a:t>npm</a:t>
+            </a:r>
+            <a:r>
+              <a:rPr lang="en-US" sz="5800" dirty="0">
+                <a:solidFill>
+                  <a:schemeClr val="bg1">
+                    <a:lumMod val="50000"/>
+                  </a:schemeClr>
+                </a:solidFill>
+                <a:latin typeface="Arial"/>
+                <a:cs typeface="Arial"/>
+              </a:rPr>
+              <a:t> install body-parser" body-parser extension for Node.js</a:t>
             </a:r>
           </a:p>
           <a:p>
@@ -5909,6 +6039,45 @@
               <a:buFont typeface="Arial"/>
               <a:buChar char="•"/>
             </a:pPr>
+            <a:r>
+              <a:rPr lang="en-US" sz="5800" dirty="0">
+                <a:solidFill>
+                  <a:schemeClr val="bg1">
+                    <a:lumMod val="50000"/>
+                  </a:schemeClr>
+                </a:solidFill>
+                <a:latin typeface="Arial"/>
+                <a:cs typeface="Arial"/>
+              </a:rPr>
+              <a:t>Type "node app.js" to run application</a:t>
+            </a:r>
+          </a:p>
+          <a:p>
+            <a:pPr marL="857250" indent="-857250">
+              <a:spcBef>
+                <a:spcPts val="3200"/>
+              </a:spcBef>
+              <a:spcAft>
+                <a:spcPts val="1600"/>
+              </a:spcAft>
+              <a:buClr>
+                <a:srgbClr val="E4171F"/>
+              </a:buClr>
+              <a:buFont typeface="Arial"/>
+              <a:buChar char="•"/>
+            </a:pPr>
+            <a:r>
+              <a:rPr lang="en-US" sz="5800" dirty="0">
+                <a:solidFill>
+                  <a:schemeClr val="bg1">
+                    <a:lumMod val="50000"/>
+                  </a:schemeClr>
+                </a:solidFill>
+                <a:latin typeface="Arial"/>
+                <a:cs typeface="Arial"/>
+              </a:rPr>
+              <a:t>Your bot should be accessible at "http://localhost:8081/". Check "http://localhost:8081/info" in your browser to see if it works</a:t>
+            </a:r>
             <a:endParaRPr lang="en-US" sz="5800" dirty="0">
               <a:solidFill>
                 <a:schemeClr val="bg1">
@@ -5969,7 +6138,7 @@
           </a:ln>
           <a:extLst>
             <a:ext uri="{C572A759-6A51-4108-AA02-DFA0A04FC94B}">
-              <ma14:wrappingTextBoxFlag xmlns="" xmlns:ma14="http://schemas.microsoft.com/office/mac/drawingml/2011/main" val="1"/>
+              <ma14:wrappingTextBoxFlag xmlns:ma14="http://schemas.microsoft.com/office/mac/drawingml/2011/main" xmlns="" val="1"/>
             </a:ext>
           </a:extLst>
         </p:spPr>
@@ -6029,20 +6198,13 @@
               </a:rPr>
               <a:t> </a:t>
             </a:r>
-            <a:endParaRPr lang="en-GB" sz="3100" dirty="0">
-              <a:solidFill>
-                <a:schemeClr val="bg1"/>
-              </a:solidFill>
-              <a:latin typeface="Arial"/>
-              <a:cs typeface="Arial"/>
-            </a:endParaRPr>
           </a:p>
         </p:txBody>
       </p:sp>
     </p:spTree>
     <p:extLst>
       <p:ext uri="{BB962C8B-B14F-4D97-AF65-F5344CB8AC3E}">
-        <p14:creationId xmlns:p14="http://schemas.microsoft.com/office/powerpoint/2010/main" val="1153594365"/>
+        <p14:creationId xmlns:p14="http://schemas.microsoft.com/office/powerpoint/2010/main" val="72714381"/>
       </p:ext>
     </p:extLst>
   </p:cSld>
@@ -6096,7 +6258,7 @@
           </a:ln>
           <a:extLst>
             <a:ext uri="{C572A759-6A51-4108-AA02-DFA0A04FC94B}">
-              <ma14:wrappingTextBoxFlag xmlns="" xmlns:ma14="http://schemas.microsoft.com/office/mac/drawingml/2011/main" val="1"/>
+              <ma14:wrappingTextBoxFlag xmlns:ma14="http://schemas.microsoft.com/office/mac/drawingml/2011/main" xmlns="" val="1"/>
             </a:ext>
           </a:extLst>
         </p:spPr>
@@ -6240,7 +6402,7 @@
           </a:ln>
           <a:extLst>
             <a:ext uri="{C572A759-6A51-4108-AA02-DFA0A04FC94B}">
-              <ma14:wrappingTextBoxFlag xmlns="" xmlns:ma14="http://schemas.microsoft.com/office/mac/drawingml/2011/main" val="1"/>
+              <ma14:wrappingTextBoxFlag xmlns:ma14="http://schemas.microsoft.com/office/mac/drawingml/2011/main" xmlns="" val="1"/>
             </a:ext>
           </a:extLst>
         </p:spPr>
@@ -7228,7 +7390,7 @@
           </a:ln>
           <a:extLst>
             <a:ext uri="{C572A759-6A51-4108-AA02-DFA0A04FC94B}">
-              <ma14:wrappingTextBoxFlag xmlns="" xmlns:ma14="http://schemas.microsoft.com/office/mac/drawingml/2011/main" val="1"/>
+              <ma14:wrappingTextBoxFlag xmlns:ma14="http://schemas.microsoft.com/office/mac/drawingml/2011/main" xmlns="" val="1"/>
             </a:ext>
           </a:extLst>
         </p:spPr>
@@ -7288,13 +7450,6 @@
               </a:rPr>
               <a:t> </a:t>
             </a:r>
-            <a:endParaRPr lang="en-GB" sz="3100" dirty="0">
-              <a:solidFill>
-                <a:schemeClr val="bg1"/>
-              </a:solidFill>
-              <a:latin typeface="Arial"/>
-              <a:cs typeface="Arial"/>
-            </a:endParaRPr>
           </a:p>
         </p:txBody>
       </p:sp>
@@ -7355,7 +7510,7 @@
           </a:ln>
           <a:extLst>
             <a:ext uri="{C572A759-6A51-4108-AA02-DFA0A04FC94B}">
-              <ma14:wrappingTextBoxFlag xmlns="" xmlns:ma14="http://schemas.microsoft.com/office/mac/drawingml/2011/main" val="1"/>
+              <ma14:wrappingTextBoxFlag xmlns:ma14="http://schemas.microsoft.com/office/mac/drawingml/2011/main" xmlns="" val="1"/>
             </a:ext>
           </a:extLst>
         </p:spPr>
@@ -7516,7 +7671,7 @@
           </a:ln>
           <a:extLst>
             <a:ext uri="{C572A759-6A51-4108-AA02-DFA0A04FC94B}">
-              <ma14:wrappingTextBoxFlag xmlns="" xmlns:ma14="http://schemas.microsoft.com/office/mac/drawingml/2011/main" val="1"/>
+              <ma14:wrappingTextBoxFlag xmlns:ma14="http://schemas.microsoft.com/office/mac/drawingml/2011/main" xmlns="" val="1"/>
             </a:ext>
           </a:extLst>
         </p:spPr>
@@ -7576,13 +7731,6 @@
               </a:rPr>
               <a:t> </a:t>
             </a:r>
-            <a:endParaRPr lang="en-GB" sz="3100" dirty="0">
-              <a:solidFill>
-                <a:schemeClr val="bg1"/>
-              </a:solidFill>
-              <a:latin typeface="Arial"/>
-              <a:cs typeface="Arial"/>
-            </a:endParaRPr>
           </a:p>
         </p:txBody>
       </p:sp>
@@ -9047,7 +9195,7 @@
           </a:ln>
           <a:extLst>
             <a:ext uri="{C572A759-6A51-4108-AA02-DFA0A04FC94B}">
-              <ma14:wrappingTextBoxFlag xmlns="" xmlns:ma14="http://schemas.microsoft.com/office/mac/drawingml/2011/main" val="1"/>
+              <ma14:wrappingTextBoxFlag xmlns:ma14="http://schemas.microsoft.com/office/mac/drawingml/2011/main" xmlns="" val="1"/>
             </a:ext>
           </a:extLst>
         </p:spPr>
@@ -9900,7 +10048,7 @@
           </a:ln>
           <a:extLst>
             <a:ext uri="{C572A759-6A51-4108-AA02-DFA0A04FC94B}">
-              <ma14:wrappingTextBoxFlag xmlns="" xmlns:ma14="http://schemas.microsoft.com/office/mac/drawingml/2011/main" val="1"/>
+              <ma14:wrappingTextBoxFlag xmlns:ma14="http://schemas.microsoft.com/office/mac/drawingml/2011/main" xmlns="" val="1"/>
             </a:ext>
           </a:extLst>
         </p:spPr>
@@ -9960,13 +10108,6 @@
               </a:rPr>
               <a:t> </a:t>
             </a:r>
-            <a:endParaRPr lang="en-GB" sz="3100" dirty="0">
-              <a:solidFill>
-                <a:schemeClr val="bg1"/>
-              </a:solidFill>
-              <a:latin typeface="Arial"/>
-              <a:cs typeface="Arial"/>
-            </a:endParaRPr>
           </a:p>
         </p:txBody>
       </p:sp>
@@ -10511,19 +10652,7 @@
                 <a:latin typeface="Arial"/>
                 <a:cs typeface="Arial"/>
               </a:rPr>
-              <a:t>f</a:t>
-            </a:r>
-            <a:r>
-              <a:rPr lang="pl-PL" sz="3600" dirty="0" err="1" smtClean="0">
-                <a:solidFill>
-                  <a:schemeClr val="bg1">
-                    <a:lumMod val="50000"/>
-                  </a:schemeClr>
-                </a:solidFill>
-                <a:latin typeface="Arial"/>
-                <a:cs typeface="Arial"/>
-              </a:rPr>
-              <a:t>our</a:t>
+              <a:t>four</a:t>
             </a:r>
             <a:r>
               <a:rPr lang="pl-PL" sz="3600" dirty="0" smtClean="0">
@@ -11147,7 +11276,7 @@
           </a:ln>
           <a:extLst>
             <a:ext uri="{C572A759-6A51-4108-AA02-DFA0A04FC94B}">
-              <ma14:wrappingTextBoxFlag xmlns="" xmlns:ma14="http://schemas.microsoft.com/office/mac/drawingml/2011/main" val="1"/>
+              <ma14:wrappingTextBoxFlag xmlns:ma14="http://schemas.microsoft.com/office/mac/drawingml/2011/main" xmlns="" val="1"/>
             </a:ext>
           </a:extLst>
         </p:spPr>
@@ -11207,13 +11336,6 @@
               </a:rPr>
               <a:t> </a:t>
             </a:r>
-            <a:endParaRPr lang="en-GB" sz="3100" dirty="0">
-              <a:solidFill>
-                <a:schemeClr val="bg1"/>
-              </a:solidFill>
-              <a:latin typeface="Arial"/>
-              <a:cs typeface="Arial"/>
-            </a:endParaRPr>
           </a:p>
         </p:txBody>
       </p:sp>
@@ -12354,7 +12476,7 @@
           </a:ln>
           <a:extLst>
             <a:ext uri="{C572A759-6A51-4108-AA02-DFA0A04FC94B}">
-              <ma14:wrappingTextBoxFlag xmlns="" xmlns:ma14="http://schemas.microsoft.com/office/mac/drawingml/2011/main" val="1"/>
+              <ma14:wrappingTextBoxFlag xmlns:ma14="http://schemas.microsoft.com/office/mac/drawingml/2011/main" xmlns="" val="1"/>
             </a:ext>
           </a:extLst>
         </p:spPr>
@@ -12414,13 +12536,6 @@
               </a:rPr>
               <a:t> </a:t>
             </a:r>
-            <a:endParaRPr lang="en-GB" sz="3100" dirty="0">
-              <a:solidFill>
-                <a:schemeClr val="bg1"/>
-              </a:solidFill>
-              <a:latin typeface="Arial"/>
-              <a:cs typeface="Arial"/>
-            </a:endParaRPr>
           </a:p>
         </p:txBody>
       </p:sp>
@@ -12481,7 +12596,7 @@
           </a:ln>
           <a:extLst>
             <a:ext uri="{C572A759-6A51-4108-AA02-DFA0A04FC94B}">
-              <ma14:wrappingTextBoxFlag xmlns="" xmlns:ma14="http://schemas.microsoft.com/office/mac/drawingml/2011/main" val="1"/>
+              <ma14:wrappingTextBoxFlag xmlns:ma14="http://schemas.microsoft.com/office/mac/drawingml/2011/main" xmlns="" val="1"/>
             </a:ext>
           </a:extLst>
         </p:spPr>

</xml_diff>